<commit_message>
Präsentationen Python und Tkinter getrennt
</commit_message>
<xml_diff>
--- a/Python3 GUI mit Tkinter.pptx
+++ b/Python3 GUI mit Tkinter.pptx
@@ -9805,7 +9805,15 @@
             </a:r>
             <a:r>
               <a:rPr lang="de-DE" dirty="0"/>
-              <a:t>kann ein Widget in einer Zelle platziert werden, es wird dabei die "Himmelsrichtung" angegeben, also z.B. </a:t>
+              <a:t>kann ein Widget in </a:t>
+            </a:r>
+            <a:r>
+              <a:rPr lang="de-DE"/>
+              <a:t>einer Zelle ausgerichtet platziert </a:t>
+            </a:r>
+            <a:r>
+              <a:rPr lang="de-DE" dirty="0"/>
+              <a:t>werden, es wird dabei die "Himmelsrichtung" angegeben, also z.B. </a:t>
             </a:r>
             <a:r>
               <a:rPr lang="de-DE" sz="2400" b="1" dirty="0" err="1">
@@ -14916,8 +14924,8 @@
         </p:nvSpPr>
         <p:spPr>
           <a:xfrm>
-            <a:off x="107504" y="1600200"/>
-            <a:ext cx="9036496" cy="5257800"/>
+            <a:off x="107504" y="1417638"/>
+            <a:ext cx="9036496" cy="5440362"/>
           </a:xfrm>
         </p:spPr>
         <p:txBody>
@@ -15536,7 +15544,7 @@
         </p:blipFill>
         <p:spPr>
           <a:xfrm>
-            <a:off x="6444208" y="5373216"/>
+            <a:off x="6333522" y="5140103"/>
             <a:ext cx="2376264" cy="600517"/>
           </a:xfrm>
           <a:prstGeom prst="rect">
@@ -15544,6 +15552,49 @@
           </a:prstGeom>
         </p:spPr>
       </p:pic>
+      <p:sp>
+        <p:nvSpPr>
+          <p:cNvPr id="4" name="Textfeld 3">
+            <a:extLst>
+              <a:ext uri="{FF2B5EF4-FFF2-40B4-BE49-F238E27FC236}">
+                <a16:creationId xmlns:a16="http://schemas.microsoft.com/office/drawing/2014/main" id="{66FFF1A0-5390-E488-CC06-B26A2C4461E4}"/>
+              </a:ext>
+            </a:extLst>
+          </p:cNvPr>
+          <p:cNvSpPr txBox="1"/>
+          <p:nvPr/>
+        </p:nvSpPr>
+        <p:spPr>
+          <a:xfrm>
+            <a:off x="7020272" y="5740620"/>
+            <a:ext cx="1207382" cy="261610"/>
+          </a:xfrm>
+          <a:prstGeom prst="rect">
+            <a:avLst/>
+          </a:prstGeom>
+          <a:noFill/>
+        </p:spPr>
+        <p:txBody>
+          <a:bodyPr wrap="none" rtlCol="0">
+            <a:spAutoFit/>
+          </a:bodyPr>
+          <a:lstStyle/>
+          <a:p>
+            <a:r>
+              <a:rPr lang="de-DE" sz="1100" dirty="0"/>
+              <a:t>Ein "</a:t>
+            </a:r>
+            <a:r>
+              <a:rPr lang="de-DE" sz="1100" dirty="0" err="1"/>
+              <a:t>Toolwindow</a:t>
+            </a:r>
+            <a:r>
+              <a:rPr lang="de-DE" sz="1100" dirty="0"/>
+              <a:t>"</a:t>
+            </a:r>
+          </a:p>
+        </p:txBody>
+      </p:sp>
     </p:spTree>
     <p:extLst>
       <p:ext uri="{BB962C8B-B14F-4D97-AF65-F5344CB8AC3E}">

</xml_diff>